<commit_message>
ERROR IN ATTRIBUTE REMOVED
</commit_message>
<xml_diff>
--- a/Presentation/class_freq_2_drug.pptx
+++ b/Presentation/class_freq_2_drug.pptx
@@ -215,7 +215,7 @@
           <a:p>
             <a:fld id="{AB7CF349-C0EE-420A-9D80-C55D75AEDD7F}" type="datetimeFigureOut">
               <a:rPr lang="en-US" smtClean="0"/>
-              <a:t>1/6/2017</a:t>
+              <a:t>1/12/2017</a:t>
             </a:fld>
             <a:endParaRPr lang="en-US"/>
           </a:p>
@@ -12923,19 +12923,30 @@
               <a:buAutoNum type="romanLcPeriod"/>
             </a:pPr>
             <a:r>
-              <a:rPr lang="en-IN" sz="2000" spc="-1" dirty="0">
-                <a:solidFill>
-                  <a:srgbClr val="000000"/>
-                </a:solidFill>
-                <a:uFill>
-                  <a:solidFill>
-                    <a:srgbClr val="FFFFFF"/>
-                  </a:solidFill>
-                </a:uFill>
-                <a:latin typeface="Calibri"/>
-              </a:rPr>
-              <a:t>REFILL COUNT</a:t>
-            </a:r>
+              <a:rPr lang="en-IN" sz="2000" spc="-1" dirty="0" smtClean="0">
+                <a:solidFill>
+                  <a:srgbClr val="000000"/>
+                </a:solidFill>
+                <a:uFill>
+                  <a:solidFill>
+                    <a:srgbClr val="FFFFFF"/>
+                  </a:solidFill>
+                </a:uFill>
+                <a:latin typeface="Calibri"/>
+              </a:rPr>
+              <a:t>ADMTYP</a:t>
+            </a:r>
+            <a:endParaRPr lang="en-IN" sz="2000" spc="-1" dirty="0">
+              <a:solidFill>
+                <a:srgbClr val="000000"/>
+              </a:solidFill>
+              <a:uFill>
+                <a:solidFill>
+                  <a:srgbClr val="FFFFFF"/>
+                </a:solidFill>
+              </a:uFill>
+              <a:latin typeface="Calibri"/>
+            </a:endParaRPr>
           </a:p>
           <a:p>
             <a:pPr marL="400050" indent="-400050">
@@ -12946,6 +12957,20 @@
               <a:buAutoNum type="romanLcPeriod"/>
             </a:pPr>
             <a:r>
+              <a:rPr lang="en-IN" sz="2000" spc="-1" dirty="0">
+                <a:solidFill>
+                  <a:srgbClr val="000000"/>
+                </a:solidFill>
+                <a:uFill>
+                  <a:solidFill>
+                    <a:srgbClr val="FFFFFF"/>
+                  </a:solidFill>
+                </a:uFill>
+                <a:latin typeface="Calibri"/>
+              </a:rPr>
+              <a:t>TOTAL </a:t>
+            </a:r>
+            <a:r>
               <a:rPr lang="en-IN" sz="2000" spc="-1" dirty="0" smtClean="0">
                 <a:solidFill>
                   <a:srgbClr val="000000"/>
@@ -12957,19 +12982,8 @@
                 </a:uFill>
                 <a:latin typeface="Calibri"/>
               </a:rPr>
-              <a:t>ADMTYP</a:t>
-            </a:r>
-            <a:endParaRPr lang="en-IN" sz="2000" spc="-1" dirty="0">
-              <a:solidFill>
-                <a:srgbClr val="000000"/>
-              </a:solidFill>
-              <a:uFill>
-                <a:solidFill>
-                  <a:srgbClr val="FFFFFF"/>
-                </a:solidFill>
-              </a:uFill>
-              <a:latin typeface="Calibri"/>
-            </a:endParaRPr>
+              <a:t>KNEE ANTRHOPLASTY</a:t>
+            </a:r>
           </a:p>
           <a:p>
             <a:pPr marL="400050" indent="-400050">
@@ -12980,20 +12994,6 @@
               <a:buAutoNum type="romanLcPeriod"/>
             </a:pPr>
             <a:r>
-              <a:rPr lang="en-IN" sz="2000" spc="-1" dirty="0">
-                <a:solidFill>
-                  <a:srgbClr val="000000"/>
-                </a:solidFill>
-                <a:uFill>
-                  <a:solidFill>
-                    <a:srgbClr val="FFFFFF"/>
-                  </a:solidFill>
-                </a:uFill>
-                <a:latin typeface="Calibri"/>
-              </a:rPr>
-              <a:t>TOTAL </a:t>
-            </a:r>
-            <a:r>
               <a:rPr lang="en-IN" sz="2000" spc="-1" dirty="0" smtClean="0">
                 <a:solidFill>
                   <a:srgbClr val="000000"/>
@@ -13005,7 +13005,7 @@
                 </a:uFill>
                 <a:latin typeface="Calibri"/>
               </a:rPr>
-              <a:t>KNEE ANTRHOPLASTY</a:t>
+              <a:t>OSTEOARTHROSIS SECONDARY  LOWER LEG</a:t>
             </a:r>
           </a:p>
           <a:p>
@@ -13017,18 +13017,18 @@
               <a:buAutoNum type="romanLcPeriod"/>
             </a:pPr>
             <a:r>
-              <a:rPr lang="en-IN" sz="2000" spc="-1" dirty="0" smtClean="0">
-                <a:solidFill>
-                  <a:srgbClr val="000000"/>
-                </a:solidFill>
-                <a:uFill>
-                  <a:solidFill>
-                    <a:srgbClr val="FFFFFF"/>
-                  </a:solidFill>
-                </a:uFill>
-                <a:latin typeface="Calibri"/>
-              </a:rPr>
-              <a:t>OSTEOARTHROSIS SECONDARY  LOWER LEG</a:t>
+              <a:rPr lang="en-US" sz="2000" spc="-1" dirty="0" smtClean="0">
+                <a:solidFill>
+                  <a:srgbClr val="000000"/>
+                </a:solidFill>
+                <a:uFill>
+                  <a:solidFill>
+                    <a:srgbClr val="FFFFFF"/>
+                  </a:solidFill>
+                </a:uFill>
+                <a:latin typeface="Calibri"/>
+              </a:rPr>
+              <a:t>REMOVAL OF FOREIGN BODY FROM EYE</a:t>
             </a:r>
           </a:p>
           <a:p>
@@ -13051,7 +13051,7 @@
                 </a:uFill>
                 <a:latin typeface="Calibri"/>
               </a:rPr>
-              <a:t>REMOVAL OF FOREIGN BODY FROM EYE</a:t>
+              <a:t>TOTAL KNEE REPLACEMENT</a:t>
             </a:r>
           </a:p>
           <a:p>
@@ -13074,7 +13074,7 @@
                 </a:uFill>
                 <a:latin typeface="Calibri"/>
               </a:rPr>
-              <a:t>TOTAL KNEE REPLACEMENT</a:t>
+              <a:t>OSTEOARTHROSIS PRIMARY LOWER LEG</a:t>
             </a:r>
           </a:p>
           <a:p>
@@ -13097,7 +13097,21 @@
                 </a:uFill>
                 <a:latin typeface="Calibri"/>
               </a:rPr>
-              <a:t>OSTEOARTHROSIS PRIMARY LOWER LEG</a:t>
+              <a:t>OSTEOARTHROSIS GENERALIZED LOWER </a:t>
+            </a:r>
+            <a:r>
+              <a:rPr lang="en-US" sz="2000" spc="-1" dirty="0" smtClean="0">
+                <a:solidFill>
+                  <a:srgbClr val="000000"/>
+                </a:solidFill>
+                <a:uFill>
+                  <a:solidFill>
+                    <a:srgbClr val="FFFFFF"/>
+                  </a:solidFill>
+                </a:uFill>
+                <a:latin typeface="Calibri"/>
+              </a:rPr>
+              <a:t>LEG</a:t>
             </a:r>
           </a:p>
           <a:p>
@@ -13109,19 +13123,30 @@
               <a:buAutoNum type="romanLcPeriod"/>
             </a:pPr>
             <a:r>
-              <a:rPr lang="en-US" sz="2000" spc="-1" dirty="0" smtClean="0">
-                <a:solidFill>
-                  <a:srgbClr val="000000"/>
-                </a:solidFill>
-                <a:uFill>
-                  <a:solidFill>
-                    <a:srgbClr val="FFFFFF"/>
-                  </a:solidFill>
-                </a:uFill>
-                <a:latin typeface="Calibri"/>
-              </a:rPr>
-              <a:t>OSTEOARTHROSIS GENERALIZED LOWER LEG</a:t>
-            </a:r>
+              <a:rPr lang="en-US" sz="2000" spc="-1" smtClean="0">
+                <a:solidFill>
+                  <a:srgbClr val="000000"/>
+                </a:solidFill>
+                <a:uFill>
+                  <a:solidFill>
+                    <a:srgbClr val="FFFFFF"/>
+                  </a:solidFill>
+                </a:uFill>
+                <a:latin typeface="Calibri"/>
+              </a:rPr>
+              <a:t>CLASS DRUG</a:t>
+            </a:r>
+            <a:endParaRPr lang="en-US" sz="2000" spc="-1" dirty="0" smtClean="0">
+              <a:solidFill>
+                <a:srgbClr val="000000"/>
+              </a:solidFill>
+              <a:uFill>
+                <a:solidFill>
+                  <a:srgbClr val="FFFFFF"/>
+                </a:solidFill>
+              </a:uFill>
+              <a:latin typeface="Calibri"/>
+            </a:endParaRPr>
           </a:p>
           <a:p>
             <a:pPr>

</xml_diff>